<commit_message>
Prototipo de tela finalizado
</commit_message>
<xml_diff>
--- a/Documentação/Prototipos de tela/Protótipo de Tela.pptx
+++ b/Documentação/Prototipos de tela/Protótipo de Tela.pptx
@@ -260,7 +260,7 @@
           <a:p>
             <a:fld id="{4BCB9DE2-452A-4751-92FD-BADCDBFDA033}" type="datetimeFigureOut">
               <a:rPr lang="pt-BR" smtClean="0"/>
-              <a:t>17/10/2020</a:t>
+              <a:t>23/10/2020</a:t>
             </a:fld>
             <a:endParaRPr lang="pt-BR"/>
           </a:p>
@@ -458,7 +458,7 @@
           <a:p>
             <a:fld id="{4BCB9DE2-452A-4751-92FD-BADCDBFDA033}" type="datetimeFigureOut">
               <a:rPr lang="pt-BR" smtClean="0"/>
-              <a:t>17/10/2020</a:t>
+              <a:t>23/10/2020</a:t>
             </a:fld>
             <a:endParaRPr lang="pt-BR"/>
           </a:p>
@@ -666,7 +666,7 @@
           <a:p>
             <a:fld id="{4BCB9DE2-452A-4751-92FD-BADCDBFDA033}" type="datetimeFigureOut">
               <a:rPr lang="pt-BR" smtClean="0"/>
-              <a:t>17/10/2020</a:t>
+              <a:t>23/10/2020</a:t>
             </a:fld>
             <a:endParaRPr lang="pt-BR"/>
           </a:p>
@@ -864,7 +864,7 @@
           <a:p>
             <a:fld id="{4BCB9DE2-452A-4751-92FD-BADCDBFDA033}" type="datetimeFigureOut">
               <a:rPr lang="pt-BR" smtClean="0"/>
-              <a:t>17/10/2020</a:t>
+              <a:t>23/10/2020</a:t>
             </a:fld>
             <a:endParaRPr lang="pt-BR"/>
           </a:p>
@@ -1139,7 +1139,7 @@
           <a:p>
             <a:fld id="{4BCB9DE2-452A-4751-92FD-BADCDBFDA033}" type="datetimeFigureOut">
               <a:rPr lang="pt-BR" smtClean="0"/>
-              <a:t>17/10/2020</a:t>
+              <a:t>23/10/2020</a:t>
             </a:fld>
             <a:endParaRPr lang="pt-BR"/>
           </a:p>
@@ -1404,7 +1404,7 @@
           <a:p>
             <a:fld id="{4BCB9DE2-452A-4751-92FD-BADCDBFDA033}" type="datetimeFigureOut">
               <a:rPr lang="pt-BR" smtClean="0"/>
-              <a:t>17/10/2020</a:t>
+              <a:t>23/10/2020</a:t>
             </a:fld>
             <a:endParaRPr lang="pt-BR"/>
           </a:p>
@@ -1816,7 +1816,7 @@
           <a:p>
             <a:fld id="{4BCB9DE2-452A-4751-92FD-BADCDBFDA033}" type="datetimeFigureOut">
               <a:rPr lang="pt-BR" smtClean="0"/>
-              <a:t>17/10/2020</a:t>
+              <a:t>23/10/2020</a:t>
             </a:fld>
             <a:endParaRPr lang="pt-BR"/>
           </a:p>
@@ -1957,7 +1957,7 @@
           <a:p>
             <a:fld id="{4BCB9DE2-452A-4751-92FD-BADCDBFDA033}" type="datetimeFigureOut">
               <a:rPr lang="pt-BR" smtClean="0"/>
-              <a:t>17/10/2020</a:t>
+              <a:t>23/10/2020</a:t>
             </a:fld>
             <a:endParaRPr lang="pt-BR"/>
           </a:p>
@@ -2070,7 +2070,7 @@
           <a:p>
             <a:fld id="{4BCB9DE2-452A-4751-92FD-BADCDBFDA033}" type="datetimeFigureOut">
               <a:rPr lang="pt-BR" smtClean="0"/>
-              <a:t>17/10/2020</a:t>
+              <a:t>23/10/2020</a:t>
             </a:fld>
             <a:endParaRPr lang="pt-BR"/>
           </a:p>
@@ -2381,7 +2381,7 @@
           <a:p>
             <a:fld id="{4BCB9DE2-452A-4751-92FD-BADCDBFDA033}" type="datetimeFigureOut">
               <a:rPr lang="pt-BR" smtClean="0"/>
-              <a:t>17/10/2020</a:t>
+              <a:t>23/10/2020</a:t>
             </a:fld>
             <a:endParaRPr lang="pt-BR"/>
           </a:p>
@@ -2669,7 +2669,7 @@
           <a:p>
             <a:fld id="{4BCB9DE2-452A-4751-92FD-BADCDBFDA033}" type="datetimeFigureOut">
               <a:rPr lang="pt-BR" smtClean="0"/>
-              <a:t>17/10/2020</a:t>
+              <a:t>23/10/2020</a:t>
             </a:fld>
             <a:endParaRPr lang="pt-BR"/>
           </a:p>
@@ -2910,7 +2910,7 @@
           <a:p>
             <a:fld id="{4BCB9DE2-452A-4751-92FD-BADCDBFDA033}" type="datetimeFigureOut">
               <a:rPr lang="pt-BR" smtClean="0"/>
-              <a:t>17/10/2020</a:t>
+              <a:t>23/10/2020</a:t>
             </a:fld>
             <a:endParaRPr lang="pt-BR"/>
           </a:p>
@@ -3335,36 +3335,6 @@
           <a:chExt cx="0" cy="0"/>
         </a:xfrm>
       </p:grpSpPr>
-      <p:pic>
-        <p:nvPicPr>
-          <p:cNvPr id="5" name="Imagem 4">
-            <a:extLst>
-              <a:ext uri="{FF2B5EF4-FFF2-40B4-BE49-F238E27FC236}">
-                <a16:creationId xmlns:a16="http://schemas.microsoft.com/office/drawing/2014/main" id="{E4F2AF07-184B-469E-BF7F-D02F03A09FEC}"/>
-              </a:ext>
-            </a:extLst>
-          </p:cNvPr>
-          <p:cNvPicPr>
-            <a:picLocks noChangeAspect="1"/>
-          </p:cNvPicPr>
-          <p:nvPr/>
-        </p:nvPicPr>
-        <p:blipFill>
-          <a:blip r:embed="rId2"/>
-          <a:stretch>
-            <a:fillRect/>
-          </a:stretch>
-        </p:blipFill>
-        <p:spPr>
-          <a:xfrm>
-            <a:off x="1219200" y="-45719"/>
-            <a:ext cx="9753600" cy="6949438"/>
-          </a:xfrm>
-          <a:prstGeom prst="rect">
-            <a:avLst/>
-          </a:prstGeom>
-        </p:spPr>
-      </p:pic>
       <p:cxnSp>
         <p:nvCxnSpPr>
           <p:cNvPr id="8" name="Conector reto 7">
@@ -3406,6 +3376,36 @@
           </a:fontRef>
         </p:style>
       </p:cxnSp>
+      <p:pic>
+        <p:nvPicPr>
+          <p:cNvPr id="11" name="Imagem 10">
+            <a:extLst>
+              <a:ext uri="{FF2B5EF4-FFF2-40B4-BE49-F238E27FC236}">
+                <a16:creationId xmlns:a16="http://schemas.microsoft.com/office/drawing/2014/main" id="{1C5CE865-FA64-4B3E-A8B2-FEEE823C139D}"/>
+              </a:ext>
+            </a:extLst>
+          </p:cNvPr>
+          <p:cNvPicPr>
+            <a:picLocks noChangeAspect="1"/>
+          </p:cNvPicPr>
+          <p:nvPr/>
+        </p:nvPicPr>
+        <p:blipFill>
+          <a:blip r:embed="rId2"/>
+          <a:stretch>
+            <a:fillRect/>
+          </a:stretch>
+        </p:blipFill>
+        <p:spPr>
+          <a:xfrm>
+            <a:off x="1643273" y="246530"/>
+            <a:ext cx="8905454" cy="6364940"/>
+          </a:xfrm>
+          <a:prstGeom prst="rect">
+            <a:avLst/>
+          </a:prstGeom>
+        </p:spPr>
+      </p:pic>
     </p:spTree>
     <p:extLst>
       <p:ext uri="{BB962C8B-B14F-4D97-AF65-F5344CB8AC3E}">
@@ -3422,14 +3422,6 @@
 <file path=ppt/slides/slide2.xml><?xml version="1.0" encoding="utf-8"?>
 <p:sld xmlns:a="http://schemas.openxmlformats.org/drawingml/2006/main" xmlns:r="http://schemas.openxmlformats.org/officeDocument/2006/relationships" xmlns:p="http://schemas.openxmlformats.org/presentationml/2006/main">
   <p:cSld>
-    <p:bg>
-      <p:bgPr>
-        <a:solidFill>
-          <a:schemeClr val="bg1"/>
-        </a:solidFill>
-        <a:effectLst/>
-      </p:bgPr>
-    </p:bg>
     <p:spTree>
       <p:nvGrpSpPr>
         <p:cNvPr id="1" name=""/>
@@ -3446,21 +3438,19 @@
       </p:grpSpPr>
       <p:cxnSp>
         <p:nvCxnSpPr>
-          <p:cNvPr id="6" name="Conector reto 5">
-            <a:extLst>
-              <a:ext uri="{FF2B5EF4-FFF2-40B4-BE49-F238E27FC236}">
-                <a16:creationId xmlns:a16="http://schemas.microsoft.com/office/drawing/2014/main" id="{B5F33FE9-33C1-465E-80E4-9789C56D37CA}"/>
-              </a:ext>
-            </a:extLst>
-          </p:cNvPr>
-          <p:cNvCxnSpPr>
-            <a:cxnSpLocks/>
-          </p:cNvCxnSpPr>
+          <p:cNvPr id="8" name="Conector reto 7">
+            <a:extLst>
+              <a:ext uri="{FF2B5EF4-FFF2-40B4-BE49-F238E27FC236}">
+                <a16:creationId xmlns:a16="http://schemas.microsoft.com/office/drawing/2014/main" id="{4D245216-AFDE-4B38-A3E9-116FE2ACC179}"/>
+              </a:ext>
+            </a:extLst>
+          </p:cNvPr>
+          <p:cNvCxnSpPr/>
           <p:nvPr/>
         </p:nvCxnSpPr>
         <p:spPr>
           <a:xfrm>
-            <a:off x="1269435" y="953740"/>
+            <a:off x="1219200" y="914400"/>
             <a:ext cx="0" cy="5989319"/>
           </a:xfrm>
           <a:prstGeom prst="line">
@@ -3492,7 +3482,7 @@
           <p:cNvPr id="3" name="Imagem 2">
             <a:extLst>
               <a:ext uri="{FF2B5EF4-FFF2-40B4-BE49-F238E27FC236}">
-                <a16:creationId xmlns:a16="http://schemas.microsoft.com/office/drawing/2014/main" id="{86822BFB-56A0-412D-A838-FCF942766BD8}"/>
+                <a16:creationId xmlns:a16="http://schemas.microsoft.com/office/drawing/2014/main" id="{C69A4D17-FBA6-46C0-84BD-B18C89E1A213}"/>
               </a:ext>
             </a:extLst>
           </p:cNvPr>
@@ -3509,8 +3499,8 @@
         </p:blipFill>
         <p:spPr>
           <a:xfrm>
-            <a:off x="1269433" y="-65414"/>
-            <a:ext cx="9653132" cy="6923414"/>
+            <a:off x="1749289" y="342303"/>
+            <a:ext cx="8693422" cy="6173394"/>
           </a:xfrm>
           <a:prstGeom prst="rect">
             <a:avLst/>
@@ -3520,7 +3510,7 @@
     </p:spTree>
     <p:extLst>
       <p:ext uri="{BB962C8B-B14F-4D97-AF65-F5344CB8AC3E}">
-        <p14:creationId xmlns:p14="http://schemas.microsoft.com/office/powerpoint/2010/main" val="1448525524"/>
+        <p14:creationId xmlns:p14="http://schemas.microsoft.com/office/powerpoint/2010/main" val="4210142599"/>
       </p:ext>
     </p:extLst>
   </p:cSld>

</xml_diff>